<commit_message>
delete outdated demo presentation file
</commit_message>
<xml_diff>
--- a/docs/94Cram_行銷簡報_Demo.pptx
+++ b/docs/94Cram_行銷簡報_Demo.pptx
@@ -4065,7 +4065,7 @@
               </a:defRPr>
             </a:pPr>
             <a:r>
-              <a:t>Next.js 14 · TypeScript · Tailwind CSS · SSR 加速</a:t>
+              <a:t>新一代響應式框架 · 強型別全棧開發 · 伺服器端渲染加速</a:t>
             </a:r>
           </a:p>
         </p:txBody>
@@ -4223,7 +4223,7 @@
               </a:defRPr>
             </a:pPr>
             <a:r>
-              <a:t>Hono.js · JWT 認證 · RBAC 權限 · Zod 驗證 · RESTful API</a:t>
+              <a:t>軍規級身份認證 · 角色權限管控 · 資料驗證防護 · 標準化介面</a:t>
             </a:r>
           </a:p>
         </p:txBody>
@@ -4381,7 +4381,7 @@
               </a:defRPr>
             </a:pPr>
             <a:r>
-              <a:t>Claude LLM · RAG 知識庫 · 向量檢索 · 意圖判斷</a:t>
+              <a:t>最新一代大型語言模型 · 智慧知識引擎 · 語意向量檢索 · 意圖理解</a:t>
             </a:r>
           </a:p>
         </p:txBody>
@@ -4539,7 +4539,7 @@
               </a:defRPr>
             </a:pPr>
             <a:r>
-              <a:t>PostgreSQL · Drizzle ORM · 多租戶隔離 · 審計日誌</a:t>
+              <a:t>企業級關聯式資料庫 · 型別安全 ORM · 多租戶隔離 · 審計日誌</a:t>
             </a:r>
           </a:p>
         </p:txBody>
@@ -4697,7 +4697,7 @@
               </a:defRPr>
             </a:pPr>
             <a:r>
-              <a:t>Google Cloud Run · Cloud SQL · 自動擴縮 · Blue-Green 部署</a:t>
+              <a:t>頂級雲端無伺服器架構 · 託管式資料庫 · 自動擴縮 · 零停機部署</a:t>
             </a:r>
           </a:p>
         </p:txBody>
@@ -4848,7 +4848,7 @@
               </a:defRPr>
             </a:pPr>
             <a:r>
-              <a:t>Blue-Green 部署</a:t>
+              <a:t>雙軌熱切換部署</a:t>
             </a:r>
             <a:br/>
             <a:r>
@@ -5003,7 +5003,7 @@
               </a:defRPr>
             </a:pPr>
             <a:r>
-              <a:t>JWT + RBAC + 審計日誌</a:t>
+              <a:t>軍規級認證 + 角色權限</a:t>
             </a:r>
             <a:br/>
             <a:r>
@@ -5313,7 +5313,7 @@
               </a:defRPr>
             </a:pPr>
             <a:r>
-              <a:t>Google Cloud 台灣區</a:t>
+              <a:t>國際頂級雲端台灣區</a:t>
             </a:r>
             <a:br/>
             <a:r>
@@ -5919,7 +5919,7 @@
               </a:defRPr>
             </a:pPr>
             <a:r>
-              <a:t>JWT 認證 + SSO</a:t>
+              <a:t>軍規級認證 + SSO</a:t>
             </a:r>
           </a:p>
         </p:txBody>
@@ -6555,7 +6555,7 @@
               </a:defRPr>
             </a:pPr>
             <a:r>
-              <a:t>Google Cloud 安全</a:t>
+              <a:t>頂級雲端防護</a:t>
             </a:r>
           </a:p>
         </p:txBody>
@@ -16437,7 +16437,7 @@
               </a:defRPr>
             </a:pPr>
             <a:r>
-              <a:t>🤖  AI 驅動核心：Claude LLM + RAG 知識庫 + 自然語言操作 + 智慧預測</a:t>
+              <a:t>🤖  AI 驅動核心：頂尖大型語言模型 + 智慧知識引擎 + 自然語言操作 + 智慧預測</a:t>
             </a:r>
           </a:p>
         </p:txBody>

</xml_diff>